<commit_message>
Updated and did some slides
need to add images to my slides still
</commit_message>
<xml_diff>
--- a/Sprint 1/DanceSoft powerpoint.pptx
+++ b/Sprint 1/DanceSoft powerpoint.pptx
@@ -114,6 +114,11 @@
       </a:defRPr>
     </a:lvl9pPr>
   </p:defaultTextStyle>
+  <p:extLst>
+    <p:ext uri="{EFAFB233-063F-42B5-8137-9DF3F51BA10A}">
+      <p15:sldGuideLst xmlns:p15="http://schemas.microsoft.com/office/powerpoint/2012/main"/>
+    </p:ext>
+  </p:extLst>
 </p:presentation>
 </file>
 
@@ -343,7 +348,7 @@
           <a:p>
             <a:fld id="{4BDF68E2-58F2-4D09-BE8B-E3BD06533059}" type="datetimeFigureOut">
               <a:rPr lang="en-US" dirty="0"/>
-              <a:t>10/13/2015</a:t>
+              <a:t>10/15/2015</a:t>
             </a:fld>
             <a:endParaRPr lang="en-US" dirty="0"/>
           </a:p>
@@ -546,7 +551,7 @@
           <a:p>
             <a:fld id="{2E2D6473-DF6D-4702-B328-E0DD40540A4E}" type="datetimeFigureOut">
               <a:rPr lang="en-US" dirty="0"/>
-              <a:t>10/13/2015</a:t>
+              <a:t>10/15/2015</a:t>
             </a:fld>
             <a:endParaRPr lang="en-US" dirty="0"/>
           </a:p>
@@ -797,7 +802,7 @@
           <a:p>
             <a:fld id="{E26F7E3A-B166-407D-9866-32884E7D5B37}" type="datetimeFigureOut">
               <a:rPr lang="en-US" dirty="0"/>
-              <a:t>10/13/2015</a:t>
+              <a:t>10/15/2015</a:t>
             </a:fld>
             <a:endParaRPr lang="en-US" dirty="0"/>
           </a:p>
@@ -966,7 +971,7 @@
           <a:p>
             <a:fld id="{528FC5F6-F338-4AE4-BB23-26385BCFC423}" type="datetimeFigureOut">
               <a:rPr lang="en-US" dirty="0"/>
-              <a:t>10/13/2015</a:t>
+              <a:t>10/15/2015</a:t>
             </a:fld>
             <a:endParaRPr lang="en-US" dirty="0"/>
           </a:p>
@@ -1304,7 +1309,7 @@
           <a:p>
             <a:fld id="{20EBB0C4-6273-4C6E-B9BD-2EDC30F1CD52}" type="datetimeFigureOut">
               <a:rPr lang="en-US" dirty="0"/>
-              <a:t>10/13/2015</a:t>
+              <a:t>10/15/2015</a:t>
             </a:fld>
             <a:endParaRPr lang="en-US" dirty="0"/>
           </a:p>
@@ -1574,7 +1579,7 @@
           <a:p>
             <a:fld id="{19AB4D41-86C1-4908-B66A-0B50CEB3BF29}" type="datetimeFigureOut">
               <a:rPr lang="en-US" dirty="0"/>
-              <a:t>10/13/2015</a:t>
+              <a:t>10/15/2015</a:t>
             </a:fld>
             <a:endParaRPr lang="en-US" dirty="0"/>
           </a:p>
@@ -1948,7 +1953,7 @@
           <a:p>
             <a:fld id="{E6426E2C-56C1-4E0D-A793-0088A7FDD37E}" type="datetimeFigureOut">
               <a:rPr lang="en-US" dirty="0"/>
-              <a:t>10/13/2015</a:t>
+              <a:t>10/15/2015</a:t>
             </a:fld>
             <a:endParaRPr lang="en-US" dirty="0"/>
           </a:p>
@@ -2061,7 +2066,7 @@
           <a:p>
             <a:fld id="{C8C39B41-D8B5-4052-B551-9B5525EAA8B6}" type="datetimeFigureOut">
               <a:rPr lang="en-US" dirty="0"/>
-              <a:t>10/13/2015</a:t>
+              <a:t>10/15/2015</a:t>
             </a:fld>
             <a:endParaRPr lang="en-US" dirty="0"/>
           </a:p>
@@ -2227,7 +2232,7 @@
           <a:p>
             <a:fld id="{4D94136C-8742-45B2-AF27-D93DF72833A9}" type="datetimeFigureOut">
               <a:rPr lang="en-US" dirty="0"/>
-              <a:t>10/13/2015</a:t>
+              <a:t>10/15/2015</a:t>
             </a:fld>
             <a:endParaRPr lang="en-US" dirty="0"/>
           </a:p>
@@ -2577,7 +2582,7 @@
           <a:p>
             <a:fld id="{32ABBEA6-7C60-4B02-AE87-00D78D8422AF}" type="datetimeFigureOut">
               <a:rPr lang="en-US" dirty="0"/>
-              <a:t>10/13/2015</a:t>
+              <a:t>10/15/2015</a:t>
             </a:fld>
             <a:endParaRPr lang="en-US" dirty="0"/>
           </a:p>
@@ -2854,7 +2859,7 @@
           </a:lstStyle>
           <a:p>
             <a:r>
-              <a:rPr lang="en-US" smtClean="0"/>
+              <a:rPr lang="en-US" dirty="0" smtClean="0"/>
               <a:t>Click icon to add picture</a:t>
             </a:r>
             <a:endParaRPr lang="en-US" dirty="0"/>
@@ -2955,7 +2960,7 @@
           <a:p>
             <a:fld id="{C9CAD897-D46E-4AD2-BD9B-49DD3E640873}" type="datetimeFigureOut">
               <a:rPr lang="en-US" dirty="0"/>
-              <a:t>10/13/2015</a:t>
+              <a:t>10/15/2015</a:t>
             </a:fld>
             <a:endParaRPr lang="en-US" dirty="0"/>
           </a:p>
@@ -3237,7 +3242,7 @@
           <a:p>
             <a:fld id="{98624D31-43A5-475A-80CF-332C9F6DCF35}" type="datetimeFigureOut">
               <a:rPr lang="en-US" dirty="0"/>
-              <a:t>10/13/2015</a:t>
+              <a:t>10/15/2015</a:t>
             </a:fld>
             <a:endParaRPr lang="en-US" dirty="0"/>
           </a:p>
@@ -3879,7 +3884,7 @@
               <a:t>Sprint 2 – Continuing </a:t>
             </a:r>
             <a:r>
-              <a:rPr lang="en-US" dirty="0" err="1" smtClean="0"/>
+              <a:rPr lang="en-US" dirty="0" smtClean="0"/>
               <a:t>Qt</a:t>
             </a:r>
             <a:r>
@@ -3950,6 +3955,13 @@
   <p:clrMapOvr>
     <a:masterClrMapping/>
   </p:clrMapOvr>
+  <p:timing>
+    <p:tnLst>
+      <p:par>
+        <p:cTn id="1" dur="indefinite" restart="never" nodeType="tmRoot"/>
+      </p:par>
+    </p:tnLst>
+  </p:timing>
 </p:sld>
 </file>
 
@@ -4007,7 +4019,7 @@
           <a:bodyPr/>
           <a:lstStyle/>
           <a:p>
-            <a:endParaRPr lang="en-US"/>
+            <a:endParaRPr lang="en-US" dirty="0"/>
           </a:p>
         </p:txBody>
       </p:sp>
@@ -4085,8 +4097,12 @@
             </a:pPr>
             <a:r>
               <a:rPr lang="en-US" dirty="0" smtClean="0"/>
-              <a:t>Introduce McGough</a:t>
-            </a:r>
+              <a:t>Dance Arts Incorporated  </a:t>
+            </a:r>
+            <a:br>
+              <a:rPr lang="en-US" dirty="0" smtClean="0"/>
+            </a:br>
+            <a:endParaRPr lang="en-US" dirty="0" smtClean="0"/>
           </a:p>
           <a:p>
             <a:pPr>
@@ -4095,8 +4111,12 @@
             </a:pPr>
             <a:r>
               <a:rPr lang="en-US" dirty="0" smtClean="0"/>
-              <a:t>McGough’s Wife</a:t>
-            </a:r>
+              <a:t>Dr. Jeff McGough, Vice president </a:t>
+            </a:r>
+            <a:br>
+              <a:rPr lang="en-US" dirty="0" smtClean="0"/>
+            </a:br>
+            <a:endParaRPr lang="en-US" dirty="0" smtClean="0"/>
           </a:p>
           <a:p>
             <a:pPr>
@@ -4105,8 +4125,9 @@
             </a:pPr>
             <a:r>
               <a:rPr lang="en-US" dirty="0" smtClean="0"/>
-              <a:t>RC Academy of Dance Arts</a:t>
-            </a:r>
+              <a:t>Julie McFarland, Artistic Director</a:t>
+            </a:r>
+            <a:endParaRPr lang="en-US" dirty="0" smtClean="0"/>
           </a:p>
           <a:p>
             <a:pPr>
@@ -4115,21 +4136,7 @@
             </a:pPr>
             <a:r>
               <a:rPr lang="en-US" dirty="0" smtClean="0"/>
-              <a:t>Need for a more efficient data storage and usage software</a:t>
-            </a:r>
-          </a:p>
-          <a:p>
-            <a:pPr>
-              <a:buFont typeface="Wingdings" panose="05000000000000000000" pitchFamily="2" charset="2"/>
-              <a:buChar char="§"/>
-            </a:pPr>
-            <a:r>
-              <a:rPr lang="en-US" dirty="0" smtClean="0"/>
-              <a:t>Client </a:t>
-            </a:r>
-            <a:r>
-              <a:rPr lang="en-US" dirty="0" err="1" smtClean="0"/>
-              <a:t>constrants</a:t>
+              <a:t>Client constraints</a:t>
             </a:r>
             <a:endParaRPr lang="en-US" dirty="0"/>
           </a:p>
@@ -4246,8 +4253,8 @@
               <a:t>Project </a:t>
             </a:r>
             <a:r>
-              <a:rPr lang="en-US" dirty="0" err="1" smtClean="0"/>
-              <a:t>functionallity</a:t>
+              <a:rPr lang="en-US" dirty="0" smtClean="0"/>
+              <a:t>functionality</a:t>
             </a:r>
             <a:endParaRPr lang="en-US" dirty="0" smtClean="0"/>
           </a:p>
@@ -4343,12 +4350,12 @@
               <a:buChar char="§"/>
             </a:pPr>
             <a:r>
-              <a:rPr lang="en-US" dirty="0" err="1" smtClean="0"/>
-              <a:t>Wifi</a:t>
-            </a:r>
-            <a:r>
-              <a:rPr lang="en-US" dirty="0" smtClean="0"/>
-              <a:t>/bandwidth issues</a:t>
+              <a:rPr lang="en-US" dirty="0" smtClean="0"/>
+              <a:t>Wi-Fi/bandwidth </a:t>
+            </a:r>
+            <a:r>
+              <a:rPr lang="en-US" dirty="0" smtClean="0"/>
+              <a:t>issues</a:t>
             </a:r>
           </a:p>
           <a:p>
@@ -4445,14 +4452,49 @@
         </p:nvSpPr>
         <p:spPr/>
         <p:txBody>
-          <a:bodyPr/>
+          <a:bodyPr>
+            <a:normAutofit/>
+          </a:bodyPr>
           <a:lstStyle/>
           <a:p>
             <a:pPr>
               <a:buFont typeface="Wingdings" panose="05000000000000000000" pitchFamily="2" charset="2"/>
               <a:buChar char="§"/>
             </a:pPr>
-            <a:endParaRPr lang="en-US" dirty="0"/>
+            <a:r>
+              <a:rPr lang="en-US" sz="2400" dirty="0" smtClean="0"/>
+              <a:t>Research programming language options for the project</a:t>
+            </a:r>
+          </a:p>
+          <a:p>
+            <a:pPr>
+              <a:buFont typeface="Wingdings" panose="05000000000000000000" pitchFamily="2" charset="2"/>
+              <a:buChar char="§"/>
+            </a:pPr>
+            <a:r>
+              <a:rPr lang="en-US" sz="2400" dirty="0" smtClean="0"/>
+              <a:t>Research and select database storage options</a:t>
+            </a:r>
+          </a:p>
+          <a:p>
+            <a:pPr>
+              <a:buFont typeface="Wingdings" panose="05000000000000000000" pitchFamily="2" charset="2"/>
+              <a:buChar char="§"/>
+            </a:pPr>
+            <a:r>
+              <a:rPr lang="en-US" sz="2400" dirty="0" smtClean="0"/>
+              <a:t>Decide GUI options for selected programming language</a:t>
+            </a:r>
+          </a:p>
+          <a:p>
+            <a:pPr>
+              <a:buFont typeface="Wingdings" panose="05000000000000000000" pitchFamily="2" charset="2"/>
+              <a:buChar char="§"/>
+            </a:pPr>
+            <a:r>
+              <a:rPr lang="en-US" sz="2400" dirty="0" smtClean="0"/>
+              <a:t>Practice and learn GUI toolkit</a:t>
+            </a:r>
           </a:p>
         </p:txBody>
       </p:sp>
@@ -4529,33 +4571,65 @@
         </p:nvSpPr>
         <p:spPr/>
         <p:txBody>
-          <a:bodyPr/>
-          <a:lstStyle/>
+          <a:bodyPr>
+            <a:normAutofit lnSpcReduction="10000"/>
+          </a:bodyPr>
+          <a:lstStyle/>
+          <a:p>
+            <a:pPr marL="0" indent="0">
+              <a:buNone/>
+            </a:pPr>
+            <a:r>
+              <a:rPr lang="en-US" dirty="0" smtClean="0"/>
+              <a:t/>
+            </a:r>
+            <a:br>
+              <a:rPr lang="en-US" dirty="0" smtClean="0"/>
+            </a:br>
+            <a:endParaRPr lang="en-US" dirty="0" smtClean="0"/>
+          </a:p>
+          <a:p>
+            <a:pPr marL="0" indent="0">
+              <a:buNone/>
+            </a:pPr>
+            <a:endParaRPr lang="en-US" dirty="0"/>
+          </a:p>
+          <a:p>
+            <a:pPr marL="0" indent="0">
+              <a:buNone/>
+            </a:pPr>
+            <a:endParaRPr lang="en-US" dirty="0" smtClean="0"/>
+          </a:p>
+          <a:p>
+            <a:pPr marL="0" indent="0">
+              <a:buNone/>
+            </a:pPr>
+            <a:endParaRPr lang="en-US" dirty="0"/>
+          </a:p>
+          <a:p>
+            <a:pPr marL="0" indent="0">
+              <a:buNone/>
+            </a:pPr>
+            <a:endParaRPr lang="en-US" dirty="0" smtClean="0"/>
+          </a:p>
+          <a:p>
+            <a:pPr marL="0" indent="0">
+              <a:buNone/>
+            </a:pPr>
+            <a:endParaRPr lang="en-US" dirty="0"/>
+          </a:p>
+          <a:p>
+            <a:pPr marL="0" indent="0">
+              <a:buNone/>
+            </a:pPr>
+            <a:endParaRPr lang="en-US" dirty="0" smtClean="0"/>
+          </a:p>
           <a:p>
             <a:pPr>
               <a:buFont typeface="Wingdings" panose="05000000000000000000" pitchFamily="2" charset="2"/>
               <a:buChar char="§"/>
             </a:pPr>
-            <a:r>
-              <a:rPr lang="en-US" dirty="0"/>
-              <a:t> </a:t>
-            </a:r>
-            <a:r>
-              <a:rPr lang="en-US" dirty="0" smtClean="0"/>
-              <a:t>Swift </a:t>
-            </a:r>
-            <a:r>
-              <a:rPr lang="en-US" dirty="0" err="1" smtClean="0"/>
-              <a:t>v.s</a:t>
-            </a:r>
-            <a:r>
-              <a:rPr lang="en-US" dirty="0" smtClean="0"/>
-              <a:t>. Python pros and cons</a:t>
-            </a:r>
-            <a:br>
-              <a:rPr lang="en-US" dirty="0" smtClean="0"/>
-            </a:br>
-            <a:endParaRPr lang="en-US" dirty="0" smtClean="0"/>
+            <a:endParaRPr lang="en-US" dirty="0"/>
           </a:p>
           <a:p>
             <a:pPr>
@@ -4563,45 +4637,507 @@
               <a:buChar char="§"/>
             </a:pPr>
             <a:r>
-              <a:rPr lang="en-US" dirty="0" smtClean="0"/>
-              <a:t>Swift Information</a:t>
-            </a:r>
-          </a:p>
-          <a:p>
-            <a:pPr>
-              <a:buFont typeface="Wingdings" panose="05000000000000000000" pitchFamily="2" charset="2"/>
-              <a:buChar char="§"/>
+              <a:rPr lang="en-US" dirty="0"/>
+              <a:t>F</a:t>
+            </a:r>
+            <a:r>
+              <a:rPr lang="en-US" dirty="0" smtClean="0"/>
+              <a:t>inal Decision: Python</a:t>
+            </a:r>
+          </a:p>
+          <a:p>
+            <a:pPr marL="0" indent="0">
+              <a:buNone/>
             </a:pPr>
-            <a:r>
-              <a:rPr lang="en-US" dirty="0" smtClean="0"/>
-              <a:t>Python information</a:t>
-            </a:r>
-          </a:p>
-          <a:p>
-            <a:pPr>
-              <a:buFont typeface="Wingdings" panose="05000000000000000000" pitchFamily="2" charset="2"/>
-              <a:buChar char="§"/>
-            </a:pPr>
-            <a:endParaRPr lang="en-US" dirty="0"/>
-          </a:p>
-          <a:p>
-            <a:pPr>
-              <a:buFont typeface="Wingdings" panose="05000000000000000000" pitchFamily="2" charset="2"/>
-              <a:buChar char="§"/>
-            </a:pPr>
-            <a:r>
-              <a:rPr lang="en-US" dirty="0" smtClean="0"/>
-              <a:t>Language final decision</a:t>
-            </a:r>
-          </a:p>
-          <a:p>
-            <a:pPr marL="0" indent="0">
-              <a:buNone/>
-            </a:pPr>
-            <a:endParaRPr lang="en-US" dirty="0"/>
-          </a:p>
-        </p:txBody>
-      </p:sp>
+            <a:endParaRPr lang="en-US" dirty="0"/>
+          </a:p>
+        </p:txBody>
+      </p:sp>
+      <p:graphicFrame>
+        <p:nvGraphicFramePr>
+          <p:cNvPr id="4" name="Table 3"/>
+          <p:cNvGraphicFramePr>
+            <a:graphicFrameLocks noGrp="1"/>
+          </p:cNvGraphicFramePr>
+          <p:nvPr>
+            <p:extLst>
+              <p:ext uri="{D42A27DB-BD31-4B8C-83A1-F6EECF244321}">
+                <p14:modId xmlns:p14="http://schemas.microsoft.com/office/powerpoint/2010/main" val="3153114409"/>
+              </p:ext>
+            </p:extLst>
+          </p:nvPr>
+        </p:nvGraphicFramePr>
+        <p:xfrm>
+          <a:off x="1236371" y="1845734"/>
+          <a:ext cx="5008452" cy="3474720"/>
+        </p:xfrm>
+        <a:graphic>
+          <a:graphicData uri="http://schemas.openxmlformats.org/drawingml/2006/table">
+            <a:tbl>
+              <a:tblPr firstRow="1" bandRow="1">
+                <a:tableStyleId>{5C22544A-7EE6-4342-B048-85BDC9FD1C3A}</a:tableStyleId>
+              </a:tblPr>
+              <a:tblGrid>
+                <a:gridCol w="2504226"/>
+                <a:gridCol w="2504226"/>
+              </a:tblGrid>
+              <a:tr h="305570">
+                <a:tc>
+                  <a:txBody>
+                    <a:bodyPr/>
+                    <a:lstStyle/>
+                    <a:p>
+                      <a:r>
+                        <a:rPr lang="en-US" dirty="0" smtClean="0"/>
+                        <a:t>Team’s Swift Pro’s</a:t>
+                      </a:r>
+                      <a:endParaRPr lang="en-US" dirty="0"/>
+                    </a:p>
+                  </a:txBody>
+                  <a:tcPr/>
+                </a:tc>
+                <a:tc>
+                  <a:txBody>
+                    <a:bodyPr/>
+                    <a:lstStyle/>
+                    <a:p>
+                      <a:r>
+                        <a:rPr lang="en-US" dirty="0" smtClean="0"/>
+                        <a:t>Team’s Swift Con’s</a:t>
+                      </a:r>
+                      <a:endParaRPr lang="en-US" dirty="0"/>
+                    </a:p>
+                  </a:txBody>
+                  <a:tcPr/>
+                </a:tc>
+              </a:tr>
+              <a:tr h="534748">
+                <a:tc>
+                  <a:txBody>
+                    <a:bodyPr/>
+                    <a:lstStyle/>
+                    <a:p>
+                      <a:r>
+                        <a:rPr lang="en-US" dirty="0" smtClean="0"/>
+                        <a:t>Well</a:t>
+                      </a:r>
+                      <a:r>
+                        <a:rPr lang="en-US" baseline="0" dirty="0" smtClean="0"/>
+                        <a:t> received my Mac community</a:t>
+                      </a:r>
+                      <a:endParaRPr lang="en-US" dirty="0"/>
+                    </a:p>
+                  </a:txBody>
+                  <a:tcPr/>
+                </a:tc>
+                <a:tc>
+                  <a:txBody>
+                    <a:bodyPr/>
+                    <a:lstStyle/>
+                    <a:p>
+                      <a:r>
+                        <a:rPr lang="en-US" dirty="0" smtClean="0"/>
+                        <a:t>Mac Only</a:t>
+                      </a:r>
+                      <a:endParaRPr lang="en-US" dirty="0"/>
+                    </a:p>
+                  </a:txBody>
+                  <a:tcPr/>
+                </a:tc>
+              </a:tr>
+              <a:tr h="534748">
+                <a:tc>
+                  <a:txBody>
+                    <a:bodyPr/>
+                    <a:lstStyle/>
+                    <a:p>
+                      <a:r>
+                        <a:rPr lang="en-US" dirty="0" smtClean="0"/>
+                        <a:t>GUI Option</a:t>
+                      </a:r>
+                      <a:r>
+                        <a:rPr lang="en-US" baseline="0" dirty="0" smtClean="0"/>
+                        <a:t> Coco also well received</a:t>
+                      </a:r>
+                      <a:endParaRPr lang="en-US" dirty="0"/>
+                    </a:p>
+                  </a:txBody>
+                  <a:tcPr/>
+                </a:tc>
+                <a:tc>
+                  <a:txBody>
+                    <a:bodyPr/>
+                    <a:lstStyle/>
+                    <a:p>
+                      <a:r>
+                        <a:rPr lang="en-US" dirty="0" smtClean="0"/>
+                        <a:t>High Ramp Up</a:t>
+                      </a:r>
+                      <a:r>
+                        <a:rPr lang="en-US" baseline="0" dirty="0" smtClean="0"/>
+                        <a:t> Time</a:t>
+                      </a:r>
+                      <a:endParaRPr lang="en-US" dirty="0"/>
+                    </a:p>
+                  </a:txBody>
+                  <a:tcPr/>
+                </a:tc>
+              </a:tr>
+              <a:tr h="534748">
+                <a:tc>
+                  <a:txBody>
+                    <a:bodyPr/>
+                    <a:lstStyle/>
+                    <a:p>
+                      <a:r>
+                        <a:rPr lang="en-US" dirty="0" smtClean="0"/>
+                        <a:t>Built</a:t>
+                      </a:r>
+                      <a:r>
+                        <a:rPr lang="en-US" baseline="0" dirty="0" smtClean="0"/>
+                        <a:t> to easily port code to iOS</a:t>
+                      </a:r>
+                      <a:endParaRPr lang="en-US" dirty="0"/>
+                    </a:p>
+                  </a:txBody>
+                  <a:tcPr/>
+                </a:tc>
+                <a:tc>
+                  <a:txBody>
+                    <a:bodyPr/>
+                    <a:lstStyle/>
+                    <a:p>
+                      <a:r>
+                        <a:rPr lang="en-US" dirty="0" smtClean="0"/>
+                        <a:t>Team is new to Mac and Swift</a:t>
+                      </a:r>
+                      <a:r>
+                        <a:rPr lang="en-US" baseline="0" dirty="0" smtClean="0"/>
+                        <a:t> development</a:t>
+                      </a:r>
+                      <a:endParaRPr lang="en-US" dirty="0"/>
+                    </a:p>
+                  </a:txBody>
+                  <a:tcPr/>
+                </a:tc>
+              </a:tr>
+              <a:tr h="993103">
+                <a:tc>
+                  <a:txBody>
+                    <a:bodyPr/>
+                    <a:lstStyle/>
+                    <a:p>
+                      <a:r>
+                        <a:rPr lang="en-US" dirty="0" smtClean="0"/>
+                        <a:t>Language is more c++ (our teams most used language) like then objective C</a:t>
+                      </a:r>
+                      <a:endParaRPr lang="en-US" dirty="0"/>
+                    </a:p>
+                  </a:txBody>
+                  <a:tcPr/>
+                </a:tc>
+                <a:tc>
+                  <a:txBody>
+                    <a:bodyPr/>
+                    <a:lstStyle/>
+                    <a:p>
+                      <a:endParaRPr lang="en-US" dirty="0"/>
+                    </a:p>
+                  </a:txBody>
+                  <a:tcPr/>
+                </a:tc>
+              </a:tr>
+            </a:tbl>
+          </a:graphicData>
+        </a:graphic>
+      </p:graphicFrame>
+      <p:graphicFrame>
+        <p:nvGraphicFramePr>
+          <p:cNvPr id="5" name="Table 4"/>
+          <p:cNvGraphicFramePr>
+            <a:graphicFrameLocks noGrp="1"/>
+          </p:cNvGraphicFramePr>
+          <p:nvPr>
+            <p:extLst>
+              <p:ext uri="{D42A27DB-BD31-4B8C-83A1-F6EECF244321}">
+                <p14:modId xmlns:p14="http://schemas.microsoft.com/office/powerpoint/2010/main" val="125897333"/>
+              </p:ext>
+            </p:extLst>
+          </p:nvPr>
+        </p:nvGraphicFramePr>
+        <p:xfrm>
+          <a:off x="6383912" y="1845735"/>
+          <a:ext cx="5207866" cy="4138784"/>
+        </p:xfrm>
+        <a:graphic>
+          <a:graphicData uri="http://schemas.openxmlformats.org/drawingml/2006/table">
+            <a:tbl>
+              <a:tblPr firstRow="1" bandRow="1">
+                <a:tableStyleId>{5C22544A-7EE6-4342-B048-85BDC9FD1C3A}</a:tableStyleId>
+              </a:tblPr>
+              <a:tblGrid>
+                <a:gridCol w="2603933"/>
+                <a:gridCol w="2603933"/>
+              </a:tblGrid>
+              <a:tr h="327213">
+                <a:tc>
+                  <a:txBody>
+                    <a:bodyPr/>
+                    <a:lstStyle/>
+                    <a:p>
+                      <a:r>
+                        <a:rPr lang="en-US" dirty="0" smtClean="0"/>
+                        <a:t>Team’s Python Pro’s</a:t>
+                      </a:r>
+                      <a:endParaRPr lang="en-US" dirty="0"/>
+                    </a:p>
+                  </a:txBody>
+                  <a:tcPr/>
+                </a:tc>
+                <a:tc>
+                  <a:txBody>
+                    <a:bodyPr/>
+                    <a:lstStyle/>
+                    <a:p>
+                      <a:r>
+                        <a:rPr lang="en-US" dirty="0" smtClean="0"/>
+                        <a:t>Team’s Python Con’s</a:t>
+                      </a:r>
+                      <a:endParaRPr lang="en-US" dirty="0"/>
+                    </a:p>
+                  </a:txBody>
+                  <a:tcPr/>
+                </a:tc>
+              </a:tr>
+              <a:tr h="572624">
+                <a:tc>
+                  <a:txBody>
+                    <a:bodyPr/>
+                    <a:lstStyle/>
+                    <a:p>
+                      <a:r>
+                        <a:rPr lang="en-US" dirty="0" smtClean="0"/>
+                        <a:t>Team is more experienced</a:t>
+                      </a:r>
+                      <a:endParaRPr lang="en-US" dirty="0"/>
+                    </a:p>
+                  </a:txBody>
+                  <a:tcPr/>
+                </a:tc>
+                <a:tc>
+                  <a:txBody>
+                    <a:bodyPr/>
+                    <a:lstStyle/>
+                    <a:p>
+                      <a:r>
+                        <a:rPr lang="en-US" dirty="0" smtClean="0"/>
+                        <a:t>Not Mac</a:t>
+                      </a:r>
+                      <a:r>
+                        <a:rPr lang="en-US" baseline="0" dirty="0" smtClean="0"/>
+                        <a:t> native </a:t>
+                      </a:r>
+                      <a:endParaRPr lang="en-US" dirty="0"/>
+                    </a:p>
+                  </a:txBody>
+                  <a:tcPr/>
+                </a:tc>
+              </a:tr>
+              <a:tr h="572624">
+                <a:tc>
+                  <a:txBody>
+                    <a:bodyPr/>
+                    <a:lstStyle/>
+                    <a:p>
+                      <a:r>
+                        <a:rPr lang="en-US" dirty="0" smtClean="0"/>
+                        <a:t>Python is cross-platform</a:t>
+                      </a:r>
+                      <a:endParaRPr lang="en-US" dirty="0"/>
+                    </a:p>
+                  </a:txBody>
+                  <a:tcPr/>
+                </a:tc>
+                <a:tc>
+                  <a:txBody>
+                    <a:bodyPr/>
+                    <a:lstStyle/>
+                    <a:p>
+                      <a:r>
+                        <a:rPr lang="en-US" baseline="0" dirty="0" smtClean="0"/>
+                        <a:t>Project will not be as easy to port to mobile</a:t>
+                      </a:r>
+                      <a:endParaRPr lang="en-US" dirty="0"/>
+                    </a:p>
+                  </a:txBody>
+                  <a:tcPr/>
+                </a:tc>
+              </a:tr>
+              <a:tr h="572624">
+                <a:tc>
+                  <a:txBody>
+                    <a:bodyPr/>
+                    <a:lstStyle/>
+                    <a:p>
+                      <a:r>
+                        <a:rPr lang="en-US" dirty="0" smtClean="0"/>
+                        <a:t>Language</a:t>
+                      </a:r>
+                      <a:r>
+                        <a:rPr lang="en-US" baseline="0" dirty="0" smtClean="0"/>
+                        <a:t> handles list data very well</a:t>
+                      </a:r>
+                      <a:endParaRPr lang="en-US" dirty="0"/>
+                    </a:p>
+                  </a:txBody>
+                  <a:tcPr/>
+                </a:tc>
+                <a:tc>
+                  <a:txBody>
+                    <a:bodyPr/>
+                    <a:lstStyle/>
+                    <a:p>
+                      <a:endParaRPr lang="en-US" dirty="0"/>
+                    </a:p>
+                  </a:txBody>
+                  <a:tcPr/>
+                </a:tc>
+              </a:tr>
+              <a:tr h="572624">
+                <a:tc>
+                  <a:txBody>
+                    <a:bodyPr/>
+                    <a:lstStyle/>
+                    <a:p>
+                      <a:pPr marL="0" marR="0" indent="0" algn="l" defTabSz="914400" rtl="0" eaLnBrk="1" fontAlgn="auto" latinLnBrk="0" hangingPunct="1">
+                        <a:lnSpc>
+                          <a:spcPct val="100000"/>
+                        </a:lnSpc>
+                        <a:spcBef>
+                          <a:spcPts val="0"/>
+                        </a:spcBef>
+                        <a:spcAft>
+                          <a:spcPts val="0"/>
+                        </a:spcAft>
+                        <a:buClrTx/>
+                        <a:buSzTx/>
+                        <a:buFontTx/>
+                        <a:buNone/>
+                        <a:tabLst/>
+                        <a:defRPr/>
+                      </a:pPr>
+                      <a:r>
+                        <a:rPr lang="en-US" dirty="0" smtClean="0"/>
+                        <a:t>Larger,</a:t>
+                      </a:r>
+                      <a:r>
+                        <a:rPr lang="en-US" baseline="0" dirty="0" smtClean="0"/>
+                        <a:t> more experienced community</a:t>
+                      </a:r>
+                      <a:endParaRPr lang="en-US" dirty="0" smtClean="0"/>
+                    </a:p>
+                  </a:txBody>
+                  <a:tcPr/>
+                </a:tc>
+                <a:tc>
+                  <a:txBody>
+                    <a:bodyPr/>
+                    <a:lstStyle/>
+                    <a:p>
+                      <a:endParaRPr lang="en-US" dirty="0"/>
+                    </a:p>
+                  </a:txBody>
+                  <a:tcPr/>
+                </a:tc>
+              </a:tr>
+              <a:tr h="572624">
+                <a:tc>
+                  <a:txBody>
+                    <a:bodyPr/>
+                    <a:lstStyle/>
+                    <a:p>
+                      <a:pPr marL="0" marR="0" indent="0" algn="l" defTabSz="914400" rtl="0" eaLnBrk="1" fontAlgn="auto" latinLnBrk="0" hangingPunct="1">
+                        <a:lnSpc>
+                          <a:spcPct val="100000"/>
+                        </a:lnSpc>
+                        <a:spcBef>
+                          <a:spcPts val="0"/>
+                        </a:spcBef>
+                        <a:spcAft>
+                          <a:spcPts val="0"/>
+                        </a:spcAft>
+                        <a:buClrTx/>
+                        <a:buSzTx/>
+                        <a:buFontTx/>
+                        <a:buNone/>
+                        <a:tabLst/>
+                        <a:defRPr/>
+                      </a:pPr>
+                      <a:r>
+                        <a:rPr lang="en-US" dirty="0" smtClean="0"/>
+                        <a:t>Academic and career experience</a:t>
+                      </a:r>
+                    </a:p>
+                  </a:txBody>
+                  <a:tcPr/>
+                </a:tc>
+                <a:tc>
+                  <a:txBody>
+                    <a:bodyPr/>
+                    <a:lstStyle/>
+                    <a:p>
+                      <a:endParaRPr lang="en-US" dirty="0"/>
+                    </a:p>
+                  </a:txBody>
+                  <a:tcPr/>
+                </a:tc>
+              </a:tr>
+              <a:tr h="572624">
+                <a:tc>
+                  <a:txBody>
+                    <a:bodyPr/>
+                    <a:lstStyle/>
+                    <a:p>
+                      <a:pPr marL="0" marR="0" indent="0" algn="l" defTabSz="914400" rtl="0" eaLnBrk="1" fontAlgn="auto" latinLnBrk="0" hangingPunct="1">
+                        <a:lnSpc>
+                          <a:spcPct val="100000"/>
+                        </a:lnSpc>
+                        <a:spcBef>
+                          <a:spcPts val="0"/>
+                        </a:spcBef>
+                        <a:spcAft>
+                          <a:spcPts val="0"/>
+                        </a:spcAft>
+                        <a:buClrTx/>
+                        <a:buSzTx/>
+                        <a:buFontTx/>
+                        <a:buNone/>
+                        <a:tabLst/>
+                        <a:defRPr/>
+                      </a:pPr>
+                      <a:r>
+                        <a:rPr lang="en-US" dirty="0" smtClean="0"/>
+                        <a:t>Client knows Python </a:t>
+                      </a:r>
+                    </a:p>
+                  </a:txBody>
+                  <a:tcPr/>
+                </a:tc>
+                <a:tc>
+                  <a:txBody>
+                    <a:bodyPr/>
+                    <a:lstStyle/>
+                    <a:p>
+                      <a:endParaRPr lang="en-US" dirty="0"/>
+                    </a:p>
+                  </a:txBody>
+                  <a:tcPr/>
+                </a:tc>
+              </a:tr>
+            </a:tbl>
+          </a:graphicData>
+        </a:graphic>
+      </p:graphicFrame>
     </p:spTree>
     <p:extLst>
       <p:ext uri="{BB962C8B-B14F-4D97-AF65-F5344CB8AC3E}">
@@ -4675,7 +5211,7 @@
           <a:lstStyle/>
           <a:p>
             <a:r>
-              <a:rPr lang="en-US" dirty="0" err="1" smtClean="0"/>
+              <a:rPr lang="en-US" dirty="0" smtClean="0"/>
               <a:t>Sql</a:t>
             </a:r>
             <a:r>
@@ -4683,7 +5219,7 @@
               <a:t> vs </a:t>
             </a:r>
             <a:r>
-              <a:rPr lang="en-US" dirty="0" err="1" smtClean="0"/>
+              <a:rPr lang="en-US" dirty="0" smtClean="0"/>
               <a:t>NonSql</a:t>
             </a:r>
             <a:endParaRPr lang="en-US" dirty="0" smtClean="0"/>
@@ -4696,7 +5232,7 @@
           </a:p>
           <a:p>
             <a:r>
-              <a:rPr lang="en-US" dirty="0" err="1" smtClean="0"/>
+              <a:rPr lang="en-US" dirty="0" smtClean="0"/>
               <a:t>Mysql</a:t>
             </a:r>
             <a:r>
@@ -4708,7 +5244,7 @@
               <a:t>vs </a:t>
             </a:r>
             <a:r>
-              <a:rPr lang="en-US" dirty="0" err="1" smtClean="0"/>
+              <a:rPr lang="en-US" dirty="0" smtClean="0"/>
               <a:t>sqlite</a:t>
             </a:r>
             <a:r>
@@ -4761,6 +5297,13 @@
   <p:clrMapOvr>
     <a:masterClrMapping/>
   </p:clrMapOvr>
+  <p:timing>
+    <p:tnLst>
+      <p:par>
+        <p:cTn id="1" dur="indefinite" restart="never" nodeType="tmRoot"/>
+      </p:par>
+    </p:tnLst>
+  </p:timing>
 </p:sld>
 </file>
 
@@ -4820,40 +5363,220 @@
         </p:nvSpPr>
         <p:spPr/>
         <p:txBody>
-          <a:bodyPr/>
-          <a:lstStyle/>
-          <a:p>
-            <a:r>
-              <a:rPr lang="en-US" dirty="0" err="1" smtClean="0"/>
+          <a:bodyPr>
+            <a:normAutofit fontScale="25000" lnSpcReduction="20000"/>
+          </a:bodyPr>
+          <a:lstStyle/>
+          <a:p>
+            <a:pPr>
+              <a:buFont typeface="Wingdings" panose="05000000000000000000" pitchFamily="2" charset="2"/>
+              <a:buChar char="§"/>
+            </a:pPr>
+            <a:r>
+              <a:rPr lang="en-US" sz="9600" dirty="0" err="1" smtClean="0"/>
               <a:t>PyQt</a:t>
             </a:r>
             <a:r>
-              <a:rPr lang="en-US" dirty="0" smtClean="0"/>
-              <a:t> vs </a:t>
-            </a:r>
-            <a:r>
-              <a:rPr lang="en-US" dirty="0" err="1" smtClean="0"/>
-              <a:t>wxpython</a:t>
-            </a:r>
-            <a:r>
-              <a:rPr lang="en-US" dirty="0" smtClean="0"/>
-              <a:t> vs </a:t>
-            </a:r>
-            <a:r>
-              <a:rPr lang="en-US" dirty="0" err="1" smtClean="0"/>
-              <a:t>kivy</a:t>
-            </a:r>
-            <a:r>
-              <a:rPr lang="en-US" dirty="0" smtClean="0"/>
-              <a:t> vs </a:t>
-            </a:r>
-            <a:r>
-              <a:rPr lang="en-US" dirty="0" err="1" smtClean="0"/>
-              <a:t>tkinter</a:t>
-            </a:r>
-            <a:endParaRPr lang="en-US" dirty="0" smtClean="0"/>
-          </a:p>
-          <a:p>
+              <a:rPr lang="en-US" sz="9600" dirty="0" smtClean="0"/>
+              <a:t> - </a:t>
+            </a:r>
+            <a:r>
+              <a:rPr lang="en-US" sz="9600" dirty="0"/>
+              <a:t>C</a:t>
+            </a:r>
+            <a:r>
+              <a:rPr lang="en-US" sz="9600" dirty="0" smtClean="0"/>
+              <a:t>omprehensive libraries </a:t>
+            </a:r>
+            <a:r>
+              <a:rPr lang="en-US" sz="9600" dirty="0"/>
+              <a:t>of tools and </a:t>
+            </a:r>
+            <a:r>
+              <a:rPr lang="en-US" sz="9600" dirty="0" smtClean="0"/>
+              <a:t>APIs</a:t>
+            </a:r>
+            <a:endParaRPr lang="en-US" sz="9600" dirty="0"/>
+          </a:p>
+          <a:p>
+            <a:pPr lvl="1">
+              <a:buFont typeface="Wingdings" panose="05000000000000000000" pitchFamily="2" charset="2"/>
+              <a:buChar char="§"/>
+            </a:pPr>
+            <a:r>
+              <a:rPr lang="en-US" sz="9600" dirty="0" smtClean="0"/>
+              <a:t>Used </a:t>
+            </a:r>
+            <a:r>
+              <a:rPr lang="en-US" sz="9600" dirty="0"/>
+              <a:t>in many </a:t>
+            </a:r>
+            <a:r>
+              <a:rPr lang="en-US" sz="9600" dirty="0" smtClean="0"/>
+              <a:t>industries</a:t>
+            </a:r>
+          </a:p>
+          <a:p>
+            <a:pPr lvl="1">
+              <a:buFont typeface="Wingdings" panose="05000000000000000000" pitchFamily="2" charset="2"/>
+              <a:buChar char="§"/>
+            </a:pPr>
+            <a:r>
+              <a:rPr lang="en-US" sz="9600" dirty="0" smtClean="0"/>
+              <a:t>Designer provide a easy way to build window</a:t>
+            </a:r>
+          </a:p>
+          <a:p>
+            <a:pPr>
+              <a:buFont typeface="Wingdings" panose="05000000000000000000" pitchFamily="2" charset="2"/>
+              <a:buChar char="§"/>
+            </a:pPr>
+            <a:r>
+              <a:rPr lang="en-US" sz="9600" dirty="0" err="1" smtClean="0"/>
+              <a:t>Wxpython</a:t>
+            </a:r>
+            <a:r>
+              <a:rPr lang="en-US" sz="9600" dirty="0" smtClean="0"/>
+              <a:t> - </a:t>
+            </a:r>
+            <a:r>
+              <a:rPr lang="en-US" sz="9600" dirty="0"/>
+              <a:t>based on </a:t>
+            </a:r>
+            <a:r>
+              <a:rPr lang="en-US" sz="9600" dirty="0" err="1"/>
+              <a:t>wxWidgets</a:t>
+            </a:r>
+            <a:r>
+              <a:rPr lang="en-US" sz="9600" dirty="0"/>
+              <a:t>, a cross-platform GUI </a:t>
+            </a:r>
+            <a:r>
+              <a:rPr lang="en-US" sz="9600" dirty="0" smtClean="0"/>
+              <a:t>library</a:t>
+            </a:r>
+          </a:p>
+          <a:p>
+            <a:pPr lvl="1">
+              <a:buFont typeface="Wingdings" panose="05000000000000000000" pitchFamily="2" charset="2"/>
+              <a:buChar char="§"/>
+            </a:pPr>
+            <a:r>
+              <a:rPr lang="en-US" sz="9600" dirty="0" smtClean="0"/>
+              <a:t>Still has a few bugs when interfacing with python 3</a:t>
+            </a:r>
+          </a:p>
+          <a:p>
+            <a:pPr>
+              <a:buFont typeface="Wingdings" panose="05000000000000000000" pitchFamily="2" charset="2"/>
+              <a:buChar char="§"/>
+            </a:pPr>
+            <a:r>
+              <a:rPr lang="en-US" sz="9600" dirty="0" err="1" smtClean="0"/>
+              <a:t>K</a:t>
+            </a:r>
+            <a:r>
+              <a:rPr lang="en-US" sz="9600" dirty="0" err="1" smtClean="0"/>
+              <a:t>ivy</a:t>
+            </a:r>
+            <a:r>
+              <a:rPr lang="en-US" sz="9600" dirty="0" smtClean="0"/>
+              <a:t> – Relatively new cross platform framework</a:t>
+            </a:r>
+          </a:p>
+          <a:p>
+            <a:pPr lvl="1">
+              <a:buFont typeface="Wingdings" panose="05000000000000000000" pitchFamily="2" charset="2"/>
+              <a:buChar char="§"/>
+            </a:pPr>
+            <a:r>
+              <a:rPr lang="en-US" sz="9600" dirty="0" smtClean="0"/>
+              <a:t>Based around a main loop</a:t>
+            </a:r>
+          </a:p>
+          <a:p>
+            <a:pPr lvl="1">
+              <a:buFont typeface="Wingdings" panose="05000000000000000000" pitchFamily="2" charset="2"/>
+              <a:buChar char="§"/>
+            </a:pPr>
+            <a:r>
+              <a:rPr lang="en-US" sz="9600" dirty="0" smtClean="0"/>
+              <a:t>Includes its own language for user interfaces</a:t>
+            </a:r>
+          </a:p>
+          <a:p>
+            <a:pPr>
+              <a:buFont typeface="Wingdings" panose="05000000000000000000" pitchFamily="2" charset="2"/>
+              <a:buChar char="§"/>
+            </a:pPr>
+            <a:r>
+              <a:rPr lang="en-US" sz="9600" dirty="0" err="1" smtClean="0"/>
+              <a:t>T</a:t>
+            </a:r>
+            <a:r>
+              <a:rPr lang="en-US" sz="9600" dirty="0" err="1" smtClean="0"/>
+              <a:t>kinter</a:t>
+            </a:r>
+            <a:r>
+              <a:rPr lang="en-US" sz="9600" dirty="0" smtClean="0"/>
+              <a:t> – The default pre-included GUI with Python </a:t>
+            </a:r>
+            <a:endParaRPr lang="en-US" sz="9600" dirty="0"/>
+          </a:p>
+          <a:p>
+            <a:pPr marL="0" indent="0">
+              <a:buNone/>
+            </a:pPr>
+            <a:endParaRPr lang="en-US" sz="9600" dirty="0" smtClean="0"/>
+          </a:p>
+          <a:p>
+            <a:pPr>
+              <a:buFont typeface="Wingdings" panose="05000000000000000000" pitchFamily="2" charset="2"/>
+              <a:buChar char="§"/>
+            </a:pPr>
+            <a:r>
+              <a:rPr lang="en-US" sz="9600" dirty="0" smtClean="0"/>
+              <a:t>Final Decision: </a:t>
+            </a:r>
+            <a:r>
+              <a:rPr lang="en-US" sz="9600" dirty="0" err="1" smtClean="0"/>
+              <a:t>PyQt</a:t>
+            </a:r>
+            <a:r>
+              <a:rPr lang="en-US" sz="9600" dirty="0" smtClean="0"/>
+              <a:t/>
+            </a:r>
+            <a:br>
+              <a:rPr lang="en-US" sz="9600" dirty="0" smtClean="0"/>
+            </a:br>
+            <a:r>
+              <a:rPr lang="en-US" dirty="0" smtClean="0"/>
+              <a:t/>
+            </a:r>
+            <a:br>
+              <a:rPr lang="en-US" dirty="0" smtClean="0"/>
+            </a:br>
+            <a:r>
+              <a:rPr lang="en-US" dirty="0" smtClean="0"/>
+              <a:t/>
+            </a:r>
+            <a:br>
+              <a:rPr lang="en-US" dirty="0" smtClean="0"/>
+            </a:br>
+            <a:r>
+              <a:rPr lang="en-US" dirty="0" smtClean="0"/>
+              <a:t/>
+            </a:r>
+            <a:br>
+              <a:rPr lang="en-US" dirty="0" smtClean="0"/>
+            </a:br>
+            <a:r>
+              <a:rPr lang="en-US" dirty="0" smtClean="0"/>
+              <a:t/>
+            </a:r>
+            <a:br>
+              <a:rPr lang="en-US" dirty="0" smtClean="0"/>
+            </a:br>
             <a:endParaRPr lang="en-US" dirty="0"/>
           </a:p>
         </p:txBody>
@@ -4868,6 +5591,13 @@
   <p:clrMapOvr>
     <a:masterClrMapping/>
   </p:clrMapOvr>
+  <p:timing>
+    <p:tnLst>
+      <p:par>
+        <p:cTn id="1" dur="indefinite" restart="never" nodeType="tmRoot"/>
+      </p:par>
+    </p:tnLst>
+  </p:timing>
 </p:sld>
 </file>
 
@@ -4954,6 +5684,13 @@
   <p:clrMapOvr>
     <a:masterClrMapping/>
   </p:clrMapOvr>
+  <p:timing>
+    <p:tnLst>
+      <p:par>
+        <p:cTn id="1" dur="indefinite" restart="never" nodeType="tmRoot"/>
+      </p:par>
+    </p:tnLst>
+  </p:timing>
 </p:sld>
 </file>
 

</xml_diff>